<commit_message>
KUGODS week 5 revised
</commit_message>
<xml_diff>
--- a/KUGODS Junior Algorithm study/정규세션 알고리즘 7주차.pptx
+++ b/KUGODS Junior Algorithm study/정규세션 알고리즘 7주차.pptx
@@ -5449,8 +5449,29 @@
                 <a:latin typeface="NanumSquareOTF_ac" panose="020B0600000101010101" pitchFamily="34" charset="-127"/>
                 <a:ea typeface="NanumSquareOTF_ac" panose="020B0600000101010101" pitchFamily="34" charset="-127"/>
               </a:rPr>
-              <a:t>. DP</a:t>
-            </a:r>
+              <a:t>. </a:t>
+            </a:r>
+            <a:r>
+              <a:rPr kumimoji="1" lang="ko-KR" altLang="en-US" sz="2400">
+                <a:solidFill>
+                  <a:schemeClr val="bg1">
+                    <a:lumMod val="50000"/>
+                  </a:schemeClr>
+                </a:solidFill>
+                <a:latin typeface="NanumSquareOTF_ac" panose="020B0600000101010101" pitchFamily="34" charset="-127"/>
+                <a:ea typeface="NanumSquareOTF_ac" panose="020B0600000101010101" pitchFamily="34" charset="-127"/>
+              </a:rPr>
+              <a:t>최단거리 알고리즘</a:t>
+            </a:r>
+            <a:endParaRPr kumimoji="1" lang="en-US" altLang="ko-Kore-KR" sz="2400" dirty="0">
+              <a:solidFill>
+                <a:schemeClr val="bg1">
+                  <a:lumMod val="50000"/>
+                </a:schemeClr>
+              </a:solidFill>
+              <a:latin typeface="NanumSquareOTF_ac" panose="020B0600000101010101" pitchFamily="34" charset="-127"/>
+              <a:ea typeface="NanumSquareOTF_ac" panose="020B0600000101010101" pitchFamily="34" charset="-127"/>
+            </a:endParaRPr>
           </a:p>
         </p:txBody>
       </p:sp>

</xml_diff>